<commit_message>
Performance tuning ppt updated
</commit_message>
<xml_diff>
--- a/hadoop/performance_tuning/HadoopPerformanceTuning.pptx
+++ b/hadoop/performance_tuning/HadoopPerformanceTuning.pptx
@@ -163,7 +163,7 @@
   </p:defaultTextStyle>
   <p:extLst>
     <p:ext uri="{EFAFB233-063F-42B5-8137-9DF3F51BA10A}">
-      <p15:sldGuideLst xmlns="" xmlns:p15="http://schemas.microsoft.com/office/powerpoint/2012/main">
+      <p15:sldGuideLst xmlns:p15="http://schemas.microsoft.com/office/powerpoint/2012/main" xmlns="">
         <p15:guide id="1" orient="horz" pos="2160">
           <p15:clr>
             <a:srgbClr val="A4A3A4"/>
@@ -7176,6 +7176,13 @@
   <p:clrMapOvr>
     <a:masterClrMapping/>
   </p:clrMapOvr>
+  <p:timing>
+    <p:tnLst>
+      <p:par>
+        <p:cTn xmlns:p14="http://schemas.microsoft.com/office/powerpoint/2010/main" id="1" dur="indefinite" restart="never" nodeType="tmRoot"/>
+      </p:par>
+    </p:tnLst>
+  </p:timing>
 </p:sld>
 </file>
 
@@ -11708,11 +11715,7 @@
             </a:r>
             <a:r>
               <a:rPr lang="en-US" dirty="0" smtClean="0"/>
-              <a:t>=</a:t>
-            </a:r>
-            <a:r>
-              <a:rPr lang="en-US" dirty="0" smtClean="0"/>
-              <a:t>&lt;IN_BYTES&gt;</a:t>
+              <a:t>=&lt;IN_BYTES&gt;</a:t>
             </a:r>
           </a:p>
           <a:p>
@@ -11882,11 +11885,7 @@
             </a:r>
             <a:r>
               <a:rPr lang="en-US" dirty="0" smtClean="0"/>
-              <a:t>ata </a:t>
-            </a:r>
-            <a:r>
-              <a:rPr lang="en-US" dirty="0" smtClean="0"/>
-              <a:t>might have </a:t>
+              <a:t>ata might have </a:t>
             </a:r>
           </a:p>
           <a:p>
@@ -12995,12 +12994,8 @@
               <a:t> </a:t>
             </a:r>
             <a:r>
-              <a:rPr lang="en-US" sz="2000" dirty="0" err="1"/>
-              <a:t>mapred.max.split.size</a:t>
-            </a:r>
-            <a:r>
-              <a:rPr lang="en-US" sz="2000" dirty="0"/>
-              <a:t>=</a:t>
+              <a:rPr lang="en-US" sz="2000" smtClean="0"/>
+              <a:t>mapred.reduce.tasks=</a:t>
             </a:r>
             <a:r>
               <a:rPr lang="en-US" sz="2000" dirty="0" smtClean="0"/>
@@ -14333,11 +14328,7 @@
           <a:p>
             <a:r>
               <a:rPr lang="en-US" dirty="0" smtClean="0"/>
-              <a:t>Hive Map Side joins leverages Distributed Cache </a:t>
-            </a:r>
-            <a:r>
-              <a:rPr lang="en-US" dirty="0" smtClean="0"/>
-              <a:t>concept</a:t>
+              <a:t>Hive Map Side joins leverages Distributed Cache concept</a:t>
             </a:r>
           </a:p>
           <a:p>
@@ -30431,6 +30422,13 @@
   <p:clrMapOvr>
     <a:masterClrMapping/>
   </p:clrMapOvr>
+  <p:timing>
+    <p:tnLst>
+      <p:par>
+        <p:cTn xmlns:p14="http://schemas.microsoft.com/office/powerpoint/2010/main" id="1" dur="indefinite" restart="never" nodeType="tmRoot"/>
+      </p:par>
+    </p:tnLst>
+  </p:timing>
 </p:sld>
 </file>
 
@@ -30561,6 +30559,13 @@
   <p:clrMapOvr>
     <a:masterClrMapping/>
   </p:clrMapOvr>
+  <p:timing>
+    <p:tnLst>
+      <p:par>
+        <p:cTn xmlns:p14="http://schemas.microsoft.com/office/powerpoint/2010/main" id="1" dur="indefinite" restart="never" nodeType="tmRoot"/>
+      </p:par>
+    </p:tnLst>
+  </p:timing>
 </p:sld>
 </file>
 

</xml_diff>